<commit_message>
adding one slide to lesson 36 slides.
</commit_message>
<xml_diff>
--- a/notes/L36/Lsn36.pptx
+++ b/notes/L36/Lsn36.pptx
@@ -8,7 +8,7 @@
     <p:sldMasterId id="2147483688" r:id="rId4"/>
   </p:sldMasterIdLst>
   <p:notesMasterIdLst>
-    <p:notesMasterId r:id="rId63"/>
+    <p:notesMasterId r:id="rId64"/>
   </p:notesMasterIdLst>
   <p:sldIdLst>
     <p:sldId id="415" r:id="rId5"/>
@@ -65,10 +65,11 @@
     <p:sldId id="429" r:id="rId56"/>
     <p:sldId id="430" r:id="rId57"/>
     <p:sldId id="431" r:id="rId58"/>
-    <p:sldId id="432" r:id="rId59"/>
-    <p:sldId id="436" r:id="rId60"/>
-    <p:sldId id="414" r:id="rId61"/>
-    <p:sldId id="416" r:id="rId62"/>
+    <p:sldId id="437" r:id="rId59"/>
+    <p:sldId id="432" r:id="rId60"/>
+    <p:sldId id="436" r:id="rId61"/>
+    <p:sldId id="414" r:id="rId62"/>
+    <p:sldId id="416" r:id="rId63"/>
   </p:sldIdLst>
   <p:sldSz cx="9144000" cy="6858000" type="screen4x3"/>
   <p:notesSz cx="6858000" cy="9144000"/>
@@ -282,7 +283,7 @@
           <a:p>
             <a:fld id="{E1C0A6B0-8D87-4769-9E5A-AD2D6BC63B8D}" type="datetimeFigureOut">
               <a:rPr lang="en-US" smtClean="0"/>
-              <a:t>11/27/2016</a:t>
+              <a:t>11/28/2016</a:t>
             </a:fld>
             <a:endParaRPr lang="en-US"/>
           </a:p>
@@ -3169,7 +3170,7 @@
               <a:pPr>
                 <a:defRPr/>
               </a:pPr>
-              <a:t>11/27/2016</a:t>
+              <a:t>11/28/2016</a:t>
             </a:fld>
             <a:endParaRPr lang="en-US"/>
           </a:p>
@@ -3821,7 +3822,7 @@
               <a:pPr>
                 <a:defRPr/>
               </a:pPr>
-              <a:t>27 November 2016</a:t>
+              <a:t>28 November 2016</a:t>
             </a:fld>
             <a:endParaRPr lang="en-US">
               <a:solidFill>
@@ -4150,7 +4151,7 @@
               <a:pPr>
                 <a:defRPr/>
               </a:pPr>
-              <a:t>27 November 2016</a:t>
+              <a:t>28 November 2016</a:t>
             </a:fld>
             <a:endParaRPr lang="en-US">
               <a:solidFill>
@@ -4618,7 +4619,7 @@
               <a:pPr>
                 <a:defRPr/>
               </a:pPr>
-              <a:t>27 November 2016</a:t>
+              <a:t>28 November 2016</a:t>
             </a:fld>
             <a:endParaRPr lang="en-US">
               <a:solidFill>
@@ -4777,7 +4778,7 @@
               <a:pPr>
                 <a:defRPr/>
               </a:pPr>
-              <a:t>27 November 2016</a:t>
+              <a:t>28 November 2016</a:t>
             </a:fld>
             <a:endParaRPr lang="en-US">
               <a:solidFill>
@@ -4913,7 +4914,7 @@
               <a:pPr>
                 <a:defRPr/>
               </a:pPr>
-              <a:t>27 November 2016</a:t>
+              <a:t>28 November 2016</a:t>
             </a:fld>
             <a:endParaRPr lang="en-US">
               <a:solidFill>
@@ -5427,7 +5428,7 @@
               <a:pPr>
                 <a:defRPr/>
               </a:pPr>
-              <a:t>27 November 2016</a:t>
+              <a:t>28 November 2016</a:t>
             </a:fld>
             <a:endParaRPr lang="en-US">
               <a:solidFill>
@@ -5722,7 +5723,7 @@
               <a:pPr>
                 <a:defRPr/>
               </a:pPr>
-              <a:t>27 November 2016</a:t>
+              <a:t>28 November 2016</a:t>
             </a:fld>
             <a:endParaRPr lang="en-US">
               <a:solidFill>
@@ -5933,7 +5934,7 @@
               <a:pPr>
                 <a:defRPr/>
               </a:pPr>
-              <a:t>27 November 2016</a:t>
+              <a:t>28 November 2016</a:t>
             </a:fld>
             <a:endParaRPr lang="en-US">
               <a:solidFill>
@@ -6154,7 +6155,7 @@
               <a:pPr>
                 <a:defRPr/>
               </a:pPr>
-              <a:t>27 November 2016</a:t>
+              <a:t>28 November 2016</a:t>
             </a:fld>
             <a:endParaRPr lang="en-US">
               <a:solidFill>
@@ -6343,7 +6344,7 @@
               <a:pPr>
                 <a:defRPr/>
               </a:pPr>
-              <a:t>27 November 2016</a:t>
+              <a:t>28 November 2016</a:t>
             </a:fld>
             <a:endParaRPr lang="en-US">
               <a:solidFill>
@@ -14510,7 +14511,7 @@
                 </a:spcAft>
                 <a:defRPr/>
               </a:pPr>
-              <a:t>27 November 2016</a:t>
+              <a:t>28 November 2016</a:t>
             </a:fld>
             <a:endParaRPr lang="en-US" sz="1800" b="0" dirty="0">
               <a:solidFill>
@@ -17657,7 +17658,7 @@
           <a:graphicData uri="http://schemas.openxmlformats.org/presentationml/2006/ole">
             <mc:AlternateContent xmlns:mc="http://schemas.openxmlformats.org/markup-compatibility/2006">
               <mc:Choice xmlns:v="urn:schemas-microsoft-com:vml" Requires="v">
-                <p:oleObj spid="_x0000_s8215" name="Visio" r:id="rId3" imgW="3284287" imgH="3477638" progId="Visio.Drawing.11">
+                <p:oleObj spid="_x0000_s8216" name="Visio" r:id="rId3" imgW="3284287" imgH="3477638" progId="Visio.Drawing.11">
                   <p:embed/>
                 </p:oleObj>
               </mc:Choice>
@@ -17865,7 +17866,7 @@
           <a:graphicData uri="http://schemas.openxmlformats.org/presentationml/2006/ole">
             <mc:AlternateContent xmlns:mc="http://schemas.openxmlformats.org/markup-compatibility/2006">
               <mc:Choice xmlns:v="urn:schemas-microsoft-com:vml" Requires="v">
-                <p:oleObj spid="_x0000_s9239" name="Acrobat Document" r:id="rId3" imgW="4828680" imgH="3716640" progId="AcroExch.Document.7">
+                <p:oleObj spid="_x0000_s9240" name="Acrobat Document" r:id="rId3" imgW="4828680" imgH="3716640" progId="AcroExch.Document.7">
                   <p:embed/>
                 </p:oleObj>
               </mc:Choice>
@@ -18148,7 +18149,7 @@
           <a:graphicData uri="http://schemas.openxmlformats.org/presentationml/2006/ole">
             <mc:AlternateContent xmlns:mc="http://schemas.openxmlformats.org/markup-compatibility/2006">
               <mc:Choice xmlns:v="urn:schemas-microsoft-com:vml" Requires="v">
-                <p:oleObj spid="_x0000_s10263" name="Acrobat Document" r:id="rId3" imgW="3619474" imgH="2790619" progId="AcroExch.Document.7">
+                <p:oleObj spid="_x0000_s10264" name="Acrobat Document" r:id="rId3" imgW="3619474" imgH="2790619" progId="AcroExch.Document.7">
                   <p:embed/>
                 </p:oleObj>
               </mc:Choice>
@@ -19589,7 +19590,7 @@
           <a:graphicData uri="http://schemas.openxmlformats.org/presentationml/2006/ole">
             <mc:AlternateContent xmlns:mc="http://schemas.openxmlformats.org/markup-compatibility/2006">
               <mc:Choice xmlns:v="urn:schemas-microsoft-com:vml" Requires="v">
-                <p:oleObj spid="_x0000_s11287" name="Acrobat Document" r:id="rId3" imgW="5273280" imgH="3716640" progId="AcroExch.Document.7">
+                <p:oleObj spid="_x0000_s11288" name="Acrobat Document" r:id="rId3" imgW="5273280" imgH="3716640" progId="AcroExch.Document.7">
                   <p:embed/>
                 </p:oleObj>
               </mc:Choice>
@@ -20015,7 +20016,7 @@
           <a:graphicData uri="http://schemas.openxmlformats.org/presentationml/2006/ole">
             <mc:AlternateContent xmlns:mc="http://schemas.openxmlformats.org/markup-compatibility/2006">
               <mc:Choice xmlns:v="urn:schemas-microsoft-com:vml" Requires="v">
-                <p:oleObj spid="_x0000_s12311" name="Acrobat Document" r:id="rId3" imgW="3971896" imgH="2981183" progId="AcroExch.Document.7">
+                <p:oleObj spid="_x0000_s12312" name="Acrobat Document" r:id="rId3" imgW="3971896" imgH="2981183" progId="AcroExch.Document.7">
                   <p:embed/>
                 </p:oleObj>
               </mc:Choice>
@@ -20960,7 +20961,7 @@
           <a:graphicData uri="http://schemas.openxmlformats.org/presentationml/2006/ole">
             <mc:AlternateContent xmlns:mc="http://schemas.openxmlformats.org/markup-compatibility/2006">
               <mc:Choice xmlns:v="urn:schemas-microsoft-com:vml" Requires="v">
-                <p:oleObj spid="_x0000_s13335" name="Acrobat Document" r:id="rId3" imgW="3971896" imgH="2981183" progId="AcroExch.Document.7">
+                <p:oleObj spid="_x0000_s13336" name="Acrobat Document" r:id="rId3" imgW="3971896" imgH="2981183" progId="AcroExch.Document.7">
                   <p:embed/>
                 </p:oleObj>
               </mc:Choice>
@@ -21355,7 +21356,7 @@
           <a:graphicData uri="http://schemas.openxmlformats.org/presentationml/2006/ole">
             <mc:AlternateContent xmlns:mc="http://schemas.openxmlformats.org/markup-compatibility/2006">
               <mc:Choice xmlns:v="urn:schemas-microsoft-com:vml" Requires="v">
-                <p:oleObj spid="_x0000_s14359" name="Acrobat Document" r:id="rId3" imgW="4028834" imgH="2981183" progId="Acrobat.Document.11">
+                <p:oleObj spid="_x0000_s14360" name="Acrobat Document" r:id="rId3" imgW="4028834" imgH="2981183" progId="Acrobat.Document.11">
                   <p:embed/>
                 </p:oleObj>
               </mc:Choice>
@@ -21609,7 +21610,7 @@
           <a:graphicData uri="http://schemas.openxmlformats.org/presentationml/2006/ole">
             <mc:AlternateContent xmlns:mc="http://schemas.openxmlformats.org/markup-compatibility/2006">
               <mc:Choice xmlns:v="urn:schemas-microsoft-com:vml" Requires="v">
-                <p:oleObj spid="_x0000_s15383" name="Acrobat Document" r:id="rId3" imgW="3971896" imgH="2981183" progId="AcroExch.Document.7">
+                <p:oleObj spid="_x0000_s15384" name="Acrobat Document" r:id="rId3" imgW="3971896" imgH="2981183" progId="AcroExch.Document.7">
                   <p:embed/>
                 </p:oleObj>
               </mc:Choice>
@@ -21726,7 +21727,7 @@
           <a:graphicData uri="http://schemas.openxmlformats.org/presentationml/2006/ole">
             <mc:AlternateContent xmlns:mc="http://schemas.openxmlformats.org/markup-compatibility/2006">
               <mc:Choice xmlns:v="urn:schemas-microsoft-com:vml" Requires="v">
-                <p:oleObj spid="_x0000_s16407" name="Acrobat Document" r:id="rId3" imgW="3971896" imgH="2981183" progId="AcroExch.Document.7">
+                <p:oleObj spid="_x0000_s16408" name="Acrobat Document" r:id="rId3" imgW="3971896" imgH="2981183" progId="AcroExch.Document.7">
                   <p:embed/>
                 </p:oleObj>
               </mc:Choice>
@@ -23464,7 +23465,7 @@
           <a:graphicData uri="http://schemas.openxmlformats.org/presentationml/2006/ole">
             <mc:AlternateContent xmlns:mc="http://schemas.openxmlformats.org/markup-compatibility/2006">
               <mc:Choice xmlns:v="urn:schemas-microsoft-com:vml" Requires="v">
-                <p:oleObj spid="_x0000_s17430" name="Acrobat Document" r:id="rId3" imgW="5273280" imgH="3716640" progId="AcroExch.Document.7">
+                <p:oleObj spid="_x0000_s17431" name="Acrobat Document" r:id="rId3" imgW="5273280" imgH="3716640" progId="AcroExch.Document.7">
                   <p:embed/>
                 </p:oleObj>
               </mc:Choice>
@@ -25415,7 +25416,7 @@
           <a:graphicData uri="http://schemas.openxmlformats.org/presentationml/2006/ole">
             <mc:AlternateContent xmlns:mc="http://schemas.openxmlformats.org/markup-compatibility/2006">
               <mc:Choice xmlns:v="urn:schemas-microsoft-com:vml" Requires="v">
-                <p:oleObj spid="_x0000_s18453" name="Visio" r:id="rId3" imgW="3284287" imgH="3477638" progId="Visio.Drawing.11">
+                <p:oleObj spid="_x0000_s18454" name="Visio" r:id="rId3" imgW="3284287" imgH="3477638" progId="Visio.Drawing.11">
                   <p:embed/>
                 </p:oleObj>
               </mc:Choice>
@@ -25595,7 +25596,7 @@
           <a:graphicData uri="http://schemas.openxmlformats.org/presentationml/2006/ole">
             <mc:AlternateContent xmlns:mc="http://schemas.openxmlformats.org/markup-compatibility/2006">
               <mc:Choice xmlns:v="urn:schemas-microsoft-com:vml" Requires="v">
-                <p:oleObj spid="_x0000_s19477" name="Visio" r:id="rId4" imgW="3284287" imgH="3477638" progId="Visio.Drawing.11">
+                <p:oleObj spid="_x0000_s19478" name="Visio" r:id="rId4" imgW="3284287" imgH="3477638" progId="Visio.Drawing.11">
                   <p:embed/>
                 </p:oleObj>
               </mc:Choice>
@@ -26374,12 +26375,12 @@
           <a:graphicData uri="http://schemas.openxmlformats.org/presentationml/2006/ole">
             <mc:AlternateContent xmlns:mc="http://schemas.openxmlformats.org/markup-compatibility/2006">
               <mc:Choice xmlns:v="urn:schemas-microsoft-com:vml" Requires="v">
-                <p:oleObj spid="_x0000_s22548" name="Visio" r:id="rId4" imgW="2847978" imgH="1962137" progId="Visio.Drawing.15">
+                <p:oleObj spid="_x0000_s22549" name="Visio" r:id="rId5" imgW="2847978" imgH="1962137" progId="Visio.Drawing.15">
                   <p:embed/>
                 </p:oleObj>
               </mc:Choice>
               <mc:Fallback>
-                <p:oleObj name="Visio" r:id="rId4" imgW="2847978" imgH="1962137" progId="Visio.Drawing.15">
+                <p:oleObj name="Visio" r:id="rId5" imgW="2847978" imgH="1962137" progId="Visio.Drawing.15">
                   <p:embed/>
                   <p:pic>
                     <p:nvPicPr>
@@ -26390,7 +26391,7 @@
                       <p:nvPr/>
                     </p:nvPicPr>
                     <p:blipFill>
-                      <a:blip r:embed="rId5">
+                      <a:blip r:embed="rId6">
                         <a:extLst>
                           <a:ext uri="{28A0092B-C50C-407E-A947-70E740481C1C}">
                             <a14:useLocalDpi xmlns:a14="http://schemas.microsoft.com/office/drawing/2010/main" val="0"/>
@@ -26822,12 +26823,12 @@
           <a:graphicData uri="http://schemas.openxmlformats.org/presentationml/2006/ole">
             <mc:AlternateContent xmlns:mc="http://schemas.openxmlformats.org/markup-compatibility/2006">
               <mc:Choice xmlns:v="urn:schemas-microsoft-com:vml" Requires="v">
-                <p:oleObj spid="_x0000_s23572" name="Visio" r:id="rId4" imgW="7267553" imgH="2047824" progId="Visio.Drawing.15">
+                <p:oleObj spid="_x0000_s23573" name="Visio" r:id="rId5" imgW="7267553" imgH="2047824" progId="Visio.Drawing.15">
                   <p:embed/>
                 </p:oleObj>
               </mc:Choice>
               <mc:Fallback>
-                <p:oleObj name="Visio" r:id="rId4" imgW="7267553" imgH="2047824" progId="Visio.Drawing.15">
+                <p:oleObj name="Visio" r:id="rId5" imgW="7267553" imgH="2047824" progId="Visio.Drawing.15">
                   <p:embed/>
                   <p:pic>
                     <p:nvPicPr>
@@ -26838,7 +26839,7 @@
                       <p:nvPr/>
                     </p:nvPicPr>
                     <p:blipFill>
-                      <a:blip r:embed="rId5"/>
+                      <a:blip r:embed="rId6"/>
                       <a:srcRect/>
                       <a:stretch>
                         <a:fillRect/>
@@ -28218,12 +28219,12 @@
           <a:graphicData uri="http://schemas.openxmlformats.org/presentationml/2006/ole">
             <mc:AlternateContent xmlns:mc="http://schemas.openxmlformats.org/markup-compatibility/2006">
               <mc:Choice xmlns:v="urn:schemas-microsoft-com:vml" Requires="v">
-                <p:oleObj spid="_x0000_s24596" name="Visio" r:id="rId4" imgW="7267618" imgH="2047986" progId="Visio.Drawing.15">
+                <p:oleObj spid="_x0000_s24597" name="Visio" r:id="rId5" imgW="7267618" imgH="2047986" progId="Visio.Drawing.15">
                   <p:embed/>
                 </p:oleObj>
               </mc:Choice>
               <mc:Fallback>
-                <p:oleObj name="Visio" r:id="rId4" imgW="7267618" imgH="2047986" progId="Visio.Drawing.15">
+                <p:oleObj name="Visio" r:id="rId5" imgW="7267618" imgH="2047986" progId="Visio.Drawing.15">
                   <p:embed/>
                   <p:pic>
                     <p:nvPicPr>
@@ -28234,7 +28235,7 @@
                       <p:nvPr/>
                     </p:nvPicPr>
                     <p:blipFill>
-                      <a:blip r:embed="rId5"/>
+                      <a:blip r:embed="rId6"/>
                       <a:srcRect/>
                       <a:stretch>
                         <a:fillRect/>
@@ -38279,6 +38280,788 @@
           <a:p>
             <a:r>
               <a:rPr lang="en-US" dirty="0" smtClean="0"/>
+              <a:t>ADC10CTL1 Register</a:t>
+            </a:r>
+            <a:endParaRPr lang="en-US" dirty="0"/>
+          </a:p>
+        </p:txBody>
+      </p:sp>
+      <p:pic>
+        <p:nvPicPr>
+          <p:cNvPr id="7173" name="Picture 5" descr="C:\Users\Jeffrey.Falkinburg\Documents\Courses\ECE382\Fall16\ECE382_Website_Fall_2016\notes\L36\ADC10CTL1.jpg"/>
+          <p:cNvPicPr>
+            <a:picLocks noGrp="1" noChangeAspect="1" noChangeArrowheads="1"/>
+          </p:cNvPicPr>
+          <p:nvPr>
+            <p:ph idx="1"/>
+          </p:nvPr>
+        </p:nvPicPr>
+        <p:blipFill>
+          <a:blip r:embed="rId2">
+            <a:extLst>
+              <a:ext uri="{28A0092B-C50C-407E-A947-70E740481C1C}">
+                <a14:useLocalDpi xmlns:a14="http://schemas.microsoft.com/office/drawing/2010/main" val="0"/>
+              </a:ext>
+            </a:extLst>
+          </a:blip>
+          <a:srcRect/>
+          <a:stretch>
+            <a:fillRect/>
+          </a:stretch>
+        </p:blipFill>
+        <p:spPr bwMode="auto">
+          <a:xfrm>
+            <a:off x="2130998" y="609600"/>
+            <a:ext cx="4882004" cy="6248400"/>
+          </a:xfrm>
+          <a:prstGeom prst="rect">
+            <a:avLst/>
+          </a:prstGeom>
+          <a:noFill/>
+          <a:extLst>
+            <a:ext uri="{909E8E84-426E-40DD-AFC4-6F175D3DCCD1}">
+              <a14:hiddenFill xmlns:a14="http://schemas.microsoft.com/office/drawing/2010/main">
+                <a:solidFill>
+                  <a:srgbClr val="FFFFFF"/>
+                </a:solidFill>
+              </a14:hiddenFill>
+            </a:ext>
+          </a:extLst>
+        </p:spPr>
+      </p:pic>
+      <p:sp>
+        <p:nvSpPr>
+          <p:cNvPr id="11" name="Rectangle 10"/>
+          <p:cNvSpPr/>
+          <p:nvPr/>
+        </p:nvSpPr>
+        <p:spPr bwMode="auto">
+          <a:xfrm>
+            <a:off x="1490170" y="5093491"/>
+            <a:ext cx="6062098" cy="1078709"/>
+          </a:xfrm>
+          <a:prstGeom prst="rect">
+            <a:avLst/>
+          </a:prstGeom>
+          <a:noFill/>
+          <a:ln w="25400" cap="flat" cmpd="sng" algn="ctr">
+            <a:solidFill>
+              <a:srgbClr val="FF0000"/>
+            </a:solidFill>
+            <a:prstDash val="solid"/>
+            <a:round/>
+            <a:headEnd type="none" w="med" len="med"/>
+            <a:tailEnd type="none" w="med" len="med"/>
+          </a:ln>
+          <a:effectLst/>
+        </p:spPr>
+        <p:txBody>
+          <a:bodyPr vert="horz" wrap="square" lIns="91440" tIns="45720" rIns="91440" bIns="45720" numCol="1" rtlCol="0" anchor="t" anchorCtr="0" compatLnSpc="1">
+            <a:prstTxWarp prst="textNoShape">
+              <a:avLst/>
+            </a:prstTxWarp>
+            <a:spAutoFit/>
+          </a:bodyPr>
+          <a:lstStyle/>
+          <a:p>
+            <a:pPr algn="l">
+              <a:spcBef>
+                <a:spcPct val="50000"/>
+              </a:spcBef>
+            </a:pPr>
+            <a:endParaRPr lang="en-US" sz="2400" b="0" dirty="0" smtClean="0">
+              <a:solidFill>
+                <a:srgbClr val="000000"/>
+              </a:solidFill>
+              <a:latin typeface="Times New Roman" pitchFamily="18" charset="0"/>
+              <a:sym typeface="Wingdings" pitchFamily="2" charset="2"/>
+            </a:endParaRPr>
+          </a:p>
+        </p:txBody>
+      </p:sp>
+      <p:cxnSp>
+        <p:nvCxnSpPr>
+          <p:cNvPr id="15" name="Straight Arrow Connector 14"/>
+          <p:cNvCxnSpPr/>
+          <p:nvPr/>
+        </p:nvCxnSpPr>
+        <p:spPr bwMode="auto">
+          <a:xfrm>
+            <a:off x="2616201" y="2542659"/>
+            <a:ext cx="592667" cy="0"/>
+          </a:xfrm>
+          <a:prstGeom prst="straightConnector1">
+            <a:avLst/>
+          </a:prstGeom>
+          <a:noFill/>
+          <a:ln w="25400" cap="flat" cmpd="sng" algn="ctr">
+            <a:solidFill>
+              <a:srgbClr val="FF0000"/>
+            </a:solidFill>
+            <a:prstDash val="solid"/>
+            <a:round/>
+            <a:headEnd type="none" w="med" len="med"/>
+            <a:tailEnd type="triangle"/>
+          </a:ln>
+          <a:effectLst/>
+        </p:spPr>
+      </p:cxnSp>
+      <p:sp>
+        <p:nvSpPr>
+          <p:cNvPr id="10" name="Rectangle 9"/>
+          <p:cNvSpPr/>
+          <p:nvPr/>
+        </p:nvSpPr>
+        <p:spPr>
+          <a:xfrm>
+            <a:off x="4639734" y="6274046"/>
+            <a:ext cx="4504266" cy="215444"/>
+          </a:xfrm>
+          <a:prstGeom prst="rect">
+            <a:avLst/>
+          </a:prstGeom>
+          <a:solidFill>
+            <a:schemeClr val="bg1"/>
+          </a:solidFill>
+          <a:ln>
+            <a:solidFill>
+              <a:schemeClr val="tx1"/>
+            </a:solidFill>
+          </a:ln>
+        </p:spPr>
+        <p:txBody>
+          <a:bodyPr wrap="square">
+            <a:spAutoFit/>
+          </a:bodyPr>
+          <a:lstStyle/>
+          <a:p>
+            <a:pPr marL="0" indent="0">
+              <a:buNone/>
+              <a:tabLst>
+                <a:tab pos="0" algn="l"/>
+                <a:tab pos="2398713" algn="l"/>
+              </a:tabLst>
+            </a:pPr>
+            <a:r>
+              <a:rPr lang="en-US" sz="800" dirty="0" smtClean="0">
+                <a:solidFill>
+                  <a:srgbClr val="000000"/>
+                </a:solidFill>
+                <a:latin typeface="Consolas"/>
+              </a:rPr>
+              <a:t>ADC10CTL1 </a:t>
+            </a:r>
+            <a:r>
+              <a:rPr lang="en-US" sz="800" dirty="0">
+                <a:solidFill>
+                  <a:srgbClr val="000000"/>
+                </a:solidFill>
+                <a:latin typeface="Consolas"/>
+              </a:rPr>
+              <a:t>|= INCH_4 | ADC10DIV_7</a:t>
+            </a:r>
+            <a:r>
+              <a:rPr lang="en-US" sz="800" dirty="0" smtClean="0">
+                <a:solidFill>
+                  <a:srgbClr val="000000"/>
+                </a:solidFill>
+                <a:latin typeface="Consolas"/>
+              </a:rPr>
+              <a:t>;	</a:t>
+            </a:r>
+            <a:r>
+              <a:rPr lang="en-US" sz="800" dirty="0" smtClean="0">
+                <a:solidFill>
+                  <a:srgbClr val="3F7F5F"/>
+                </a:solidFill>
+                <a:latin typeface="Consolas"/>
+              </a:rPr>
+              <a:t>// </a:t>
+            </a:r>
+            <a:r>
+              <a:rPr lang="en-US" sz="800" dirty="0">
+                <a:solidFill>
+                  <a:srgbClr val="3F7F5F"/>
+                </a:solidFill>
+                <a:latin typeface="Consolas"/>
+              </a:rPr>
+              <a:t>input </a:t>
+            </a:r>
+            <a:r>
+              <a:rPr lang="en-US" sz="800" dirty="0" err="1" smtClean="0">
+                <a:solidFill>
+                  <a:srgbClr val="3F7F5F"/>
+                </a:solidFill>
+                <a:latin typeface="Consolas"/>
+              </a:rPr>
+              <a:t>ch</a:t>
+            </a:r>
+            <a:r>
+              <a:rPr lang="en-US" sz="800" dirty="0" smtClean="0">
+                <a:solidFill>
+                  <a:srgbClr val="3F7F5F"/>
+                </a:solidFill>
+                <a:latin typeface="Consolas"/>
+              </a:rPr>
+              <a:t> A4, </a:t>
+            </a:r>
+            <a:r>
+              <a:rPr lang="en-US" sz="800" dirty="0" err="1" smtClean="0">
+                <a:solidFill>
+                  <a:srgbClr val="3F7F5F"/>
+                </a:solidFill>
+                <a:latin typeface="Consolas"/>
+              </a:rPr>
+              <a:t>Div</a:t>
+            </a:r>
+            <a:r>
+              <a:rPr lang="en-US" sz="800" dirty="0" smtClean="0">
+                <a:solidFill>
+                  <a:srgbClr val="3F7F5F"/>
+                </a:solidFill>
+                <a:latin typeface="Consolas"/>
+              </a:rPr>
+              <a:t> by 8</a:t>
+            </a:r>
+            <a:endParaRPr lang="en-US" sz="800" dirty="0">
+              <a:solidFill>
+                <a:srgbClr val="3F7F5F"/>
+              </a:solidFill>
+              <a:latin typeface="Consolas"/>
+            </a:endParaRPr>
+          </a:p>
+        </p:txBody>
+      </p:sp>
+      <p:sp>
+        <p:nvSpPr>
+          <p:cNvPr id="12" name="Oval 11"/>
+          <p:cNvSpPr/>
+          <p:nvPr/>
+        </p:nvSpPr>
+        <p:spPr bwMode="auto">
+          <a:xfrm>
+            <a:off x="6146800" y="6257278"/>
+            <a:ext cx="838200" cy="255896"/>
+          </a:xfrm>
+          <a:prstGeom prst="ellipse">
+            <a:avLst/>
+          </a:prstGeom>
+          <a:noFill/>
+          <a:ln w="25400" cap="flat" cmpd="sng" algn="ctr">
+            <a:solidFill>
+              <a:srgbClr val="FF0000"/>
+            </a:solidFill>
+            <a:prstDash val="solid"/>
+            <a:round/>
+            <a:headEnd type="none" w="med" len="med"/>
+            <a:tailEnd type="none" w="med" len="med"/>
+          </a:ln>
+          <a:effectLst/>
+        </p:spPr>
+        <p:txBody>
+          <a:bodyPr vert="horz" wrap="square" lIns="91440" tIns="45720" rIns="91440" bIns="45720" numCol="1" rtlCol="0" anchor="ctr" anchorCtr="0" compatLnSpc="1">
+            <a:prstTxWarp prst="textNoShape">
+              <a:avLst/>
+            </a:prstTxWarp>
+            <a:noAutofit/>
+          </a:bodyPr>
+          <a:lstStyle/>
+          <a:p>
+            <a:pPr>
+              <a:spcBef>
+                <a:spcPct val="50000"/>
+              </a:spcBef>
+            </a:pPr>
+            <a:endParaRPr lang="en-US" dirty="0" smtClean="0">
+              <a:solidFill>
+                <a:srgbClr val="FF0000"/>
+              </a:solidFill>
+              <a:latin typeface="Times New Roman" pitchFamily="18" charset="0"/>
+              <a:sym typeface="Wingdings" pitchFamily="2" charset="2"/>
+            </a:endParaRPr>
+          </a:p>
+        </p:txBody>
+      </p:sp>
+      <p:cxnSp>
+        <p:nvCxnSpPr>
+          <p:cNvPr id="13" name="Straight Arrow Connector 12"/>
+          <p:cNvCxnSpPr/>
+          <p:nvPr/>
+        </p:nvCxnSpPr>
+        <p:spPr bwMode="auto">
+          <a:xfrm>
+            <a:off x="4343400" y="6385226"/>
+            <a:ext cx="592667" cy="0"/>
+          </a:xfrm>
+          <a:prstGeom prst="straightConnector1">
+            <a:avLst/>
+          </a:prstGeom>
+          <a:noFill/>
+          <a:ln w="25400" cap="flat" cmpd="sng" algn="ctr">
+            <a:solidFill>
+              <a:srgbClr val="FF0000"/>
+            </a:solidFill>
+            <a:prstDash val="solid"/>
+            <a:round/>
+            <a:headEnd type="none" w="med" len="med"/>
+            <a:tailEnd type="triangle"/>
+          </a:ln>
+          <a:effectLst/>
+        </p:spPr>
+      </p:cxnSp>
+      <p:sp>
+        <p:nvSpPr>
+          <p:cNvPr id="9" name="Rectangle 8"/>
+          <p:cNvSpPr/>
+          <p:nvPr/>
+        </p:nvSpPr>
+        <p:spPr bwMode="auto">
+          <a:xfrm>
+            <a:off x="1490169" y="1794935"/>
+            <a:ext cx="6062098" cy="2057400"/>
+          </a:xfrm>
+          <a:prstGeom prst="rect">
+            <a:avLst/>
+          </a:prstGeom>
+          <a:noFill/>
+          <a:ln w="25400" cap="flat" cmpd="sng" algn="ctr">
+            <a:solidFill>
+              <a:srgbClr val="FF0000"/>
+            </a:solidFill>
+            <a:prstDash val="solid"/>
+            <a:round/>
+            <a:headEnd type="none" w="med" len="med"/>
+            <a:tailEnd type="none" w="med" len="med"/>
+          </a:ln>
+          <a:effectLst/>
+        </p:spPr>
+        <p:txBody>
+          <a:bodyPr vert="horz" wrap="square" lIns="91440" tIns="45720" rIns="91440" bIns="45720" numCol="1" rtlCol="0" anchor="t" anchorCtr="0" compatLnSpc="1">
+            <a:prstTxWarp prst="textNoShape">
+              <a:avLst/>
+            </a:prstTxWarp>
+            <a:spAutoFit/>
+          </a:bodyPr>
+          <a:lstStyle/>
+          <a:p>
+            <a:pPr algn="l">
+              <a:spcBef>
+                <a:spcPct val="50000"/>
+              </a:spcBef>
+            </a:pPr>
+            <a:endParaRPr lang="en-US" sz="2400" b="0" dirty="0" smtClean="0">
+              <a:solidFill>
+                <a:srgbClr val="000000"/>
+              </a:solidFill>
+              <a:latin typeface="Times New Roman" pitchFamily="18" charset="0"/>
+              <a:sym typeface="Wingdings" pitchFamily="2" charset="2"/>
+            </a:endParaRPr>
+          </a:p>
+        </p:txBody>
+      </p:sp>
+      <p:sp>
+        <p:nvSpPr>
+          <p:cNvPr id="14" name="Oval 13"/>
+          <p:cNvSpPr/>
+          <p:nvPr/>
+        </p:nvSpPr>
+        <p:spPr bwMode="auto">
+          <a:xfrm>
+            <a:off x="5638800" y="6248400"/>
+            <a:ext cx="574513" cy="255896"/>
+          </a:xfrm>
+          <a:prstGeom prst="ellipse">
+            <a:avLst/>
+          </a:prstGeom>
+          <a:noFill/>
+          <a:ln w="25400" cap="flat" cmpd="sng" algn="ctr">
+            <a:solidFill>
+              <a:srgbClr val="FF0000"/>
+            </a:solidFill>
+            <a:prstDash val="solid"/>
+            <a:round/>
+            <a:headEnd type="none" w="med" len="med"/>
+            <a:tailEnd type="none" w="med" len="med"/>
+          </a:ln>
+          <a:effectLst/>
+        </p:spPr>
+        <p:txBody>
+          <a:bodyPr vert="horz" wrap="square" lIns="91440" tIns="45720" rIns="91440" bIns="45720" numCol="1" rtlCol="0" anchor="ctr" anchorCtr="0" compatLnSpc="1">
+            <a:prstTxWarp prst="textNoShape">
+              <a:avLst/>
+            </a:prstTxWarp>
+            <a:noAutofit/>
+          </a:bodyPr>
+          <a:lstStyle/>
+          <a:p>
+            <a:pPr>
+              <a:spcBef>
+                <a:spcPct val="50000"/>
+              </a:spcBef>
+            </a:pPr>
+            <a:endParaRPr lang="en-US" dirty="0" smtClean="0">
+              <a:solidFill>
+                <a:srgbClr val="FF0000"/>
+              </a:solidFill>
+              <a:latin typeface="Times New Roman" pitchFamily="18" charset="0"/>
+              <a:sym typeface="Wingdings" pitchFamily="2" charset="2"/>
+            </a:endParaRPr>
+          </a:p>
+        </p:txBody>
+      </p:sp>
+    </p:spTree>
+    <p:extLst>
+      <p:ext uri="{BB962C8B-B14F-4D97-AF65-F5344CB8AC3E}">
+        <p14:creationId xmlns:p14="http://schemas.microsoft.com/office/powerpoint/2010/main" val="4220787400"/>
+      </p:ext>
+    </p:extLst>
+  </p:cSld>
+  <p:clrMapOvr>
+    <a:masterClrMapping/>
+  </p:clrMapOvr>
+  <p:timing>
+    <p:tnLst>
+      <p:par>
+        <p:cTn id="1" dur="indefinite" restart="never" nodeType="tmRoot">
+          <p:childTnLst>
+            <p:seq concurrent="1" nextAc="seek">
+              <p:cTn id="2" dur="indefinite" nodeType="mainSeq">
+                <p:childTnLst>
+                  <p:par>
+                    <p:cTn id="3" fill="hold">
+                      <p:stCondLst>
+                        <p:cond delay="indefinite"/>
+                      </p:stCondLst>
+                      <p:childTnLst>
+                        <p:par>
+                          <p:cTn id="4" fill="hold">
+                            <p:stCondLst>
+                              <p:cond delay="0"/>
+                            </p:stCondLst>
+                            <p:childTnLst>
+                              <p:par>
+                                <p:cTn id="5" presetID="1" presetClass="entr" presetSubtype="0" fill="hold" nodeType="clickEffect">
+                                  <p:stCondLst>
+                                    <p:cond delay="0"/>
+                                  </p:stCondLst>
+                                  <p:childTnLst>
+                                    <p:set>
+                                      <p:cBhvr>
+                                        <p:cTn id="6" dur="1" fill="hold">
+                                          <p:stCondLst>
+                                            <p:cond delay="0"/>
+                                          </p:stCondLst>
+                                        </p:cTn>
+                                        <p:tgtEl>
+                                          <p:spTgt spid="13"/>
+                                        </p:tgtEl>
+                                        <p:attrNameLst>
+                                          <p:attrName>style.visibility</p:attrName>
+                                        </p:attrNameLst>
+                                      </p:cBhvr>
+                                      <p:to>
+                                        <p:strVal val="visible"/>
+                                      </p:to>
+                                    </p:set>
+                                  </p:childTnLst>
+                                </p:cTn>
+                              </p:par>
+                            </p:childTnLst>
+                          </p:cTn>
+                        </p:par>
+                      </p:childTnLst>
+                    </p:cTn>
+                  </p:par>
+                  <p:par>
+                    <p:cTn id="7" fill="hold">
+                      <p:stCondLst>
+                        <p:cond delay="indefinite"/>
+                      </p:stCondLst>
+                      <p:childTnLst>
+                        <p:par>
+                          <p:cTn id="8" fill="hold">
+                            <p:stCondLst>
+                              <p:cond delay="0"/>
+                            </p:stCondLst>
+                            <p:childTnLst>
+                              <p:par>
+                                <p:cTn id="9" presetID="1" presetClass="entr" presetSubtype="0" fill="hold" grpId="0" nodeType="clickEffect">
+                                  <p:stCondLst>
+                                    <p:cond delay="0"/>
+                                  </p:stCondLst>
+                                  <p:childTnLst>
+                                    <p:set>
+                                      <p:cBhvr>
+                                        <p:cTn id="10" dur="1" fill="hold">
+                                          <p:stCondLst>
+                                            <p:cond delay="0"/>
+                                          </p:stCondLst>
+                                        </p:cTn>
+                                        <p:tgtEl>
+                                          <p:spTgt spid="14"/>
+                                        </p:tgtEl>
+                                        <p:attrNameLst>
+                                          <p:attrName>style.visibility</p:attrName>
+                                        </p:attrNameLst>
+                                      </p:cBhvr>
+                                      <p:to>
+                                        <p:strVal val="visible"/>
+                                      </p:to>
+                                    </p:set>
+                                  </p:childTnLst>
+                                </p:cTn>
+                              </p:par>
+                            </p:childTnLst>
+                          </p:cTn>
+                        </p:par>
+                      </p:childTnLst>
+                    </p:cTn>
+                  </p:par>
+                  <p:par>
+                    <p:cTn id="11" fill="hold">
+                      <p:stCondLst>
+                        <p:cond delay="indefinite"/>
+                      </p:stCondLst>
+                      <p:childTnLst>
+                        <p:par>
+                          <p:cTn id="12" fill="hold">
+                            <p:stCondLst>
+                              <p:cond delay="0"/>
+                            </p:stCondLst>
+                            <p:childTnLst>
+                              <p:par>
+                                <p:cTn id="13" presetID="1" presetClass="entr" presetSubtype="0" fill="hold" grpId="0" nodeType="clickEffect">
+                                  <p:stCondLst>
+                                    <p:cond delay="0"/>
+                                  </p:stCondLst>
+                                  <p:childTnLst>
+                                    <p:set>
+                                      <p:cBhvr>
+                                        <p:cTn id="14" dur="1" fill="hold">
+                                          <p:stCondLst>
+                                            <p:cond delay="0"/>
+                                          </p:stCondLst>
+                                        </p:cTn>
+                                        <p:tgtEl>
+                                          <p:spTgt spid="9"/>
+                                        </p:tgtEl>
+                                        <p:attrNameLst>
+                                          <p:attrName>style.visibility</p:attrName>
+                                        </p:attrNameLst>
+                                      </p:cBhvr>
+                                      <p:to>
+                                        <p:strVal val="visible"/>
+                                      </p:to>
+                                    </p:set>
+                                  </p:childTnLst>
+                                </p:cTn>
+                              </p:par>
+                            </p:childTnLst>
+                          </p:cTn>
+                        </p:par>
+                      </p:childTnLst>
+                    </p:cTn>
+                  </p:par>
+                  <p:par>
+                    <p:cTn id="15" fill="hold">
+                      <p:stCondLst>
+                        <p:cond delay="indefinite"/>
+                      </p:stCondLst>
+                      <p:childTnLst>
+                        <p:par>
+                          <p:cTn id="16" fill="hold">
+                            <p:stCondLst>
+                              <p:cond delay="0"/>
+                            </p:stCondLst>
+                            <p:childTnLst>
+                              <p:par>
+                                <p:cTn id="17" presetID="1" presetClass="entr" presetSubtype="0" fill="hold" nodeType="clickEffect">
+                                  <p:stCondLst>
+                                    <p:cond delay="0"/>
+                                  </p:stCondLst>
+                                  <p:childTnLst>
+                                    <p:set>
+                                      <p:cBhvr>
+                                        <p:cTn id="18" dur="1" fill="hold">
+                                          <p:stCondLst>
+                                            <p:cond delay="0"/>
+                                          </p:stCondLst>
+                                        </p:cTn>
+                                        <p:tgtEl>
+                                          <p:spTgt spid="15"/>
+                                        </p:tgtEl>
+                                        <p:attrNameLst>
+                                          <p:attrName>style.visibility</p:attrName>
+                                        </p:attrNameLst>
+                                      </p:cBhvr>
+                                      <p:to>
+                                        <p:strVal val="visible"/>
+                                      </p:to>
+                                    </p:set>
+                                  </p:childTnLst>
+                                </p:cTn>
+                              </p:par>
+                            </p:childTnLst>
+                          </p:cTn>
+                        </p:par>
+                      </p:childTnLst>
+                    </p:cTn>
+                  </p:par>
+                  <p:par>
+                    <p:cTn id="19" fill="hold">
+                      <p:stCondLst>
+                        <p:cond delay="indefinite"/>
+                      </p:stCondLst>
+                      <p:childTnLst>
+                        <p:par>
+                          <p:cTn id="20" fill="hold">
+                            <p:stCondLst>
+                              <p:cond delay="0"/>
+                            </p:stCondLst>
+                            <p:childTnLst>
+                              <p:par>
+                                <p:cTn id="21" presetID="1" presetClass="entr" presetSubtype="0" fill="hold" grpId="0" nodeType="clickEffect">
+                                  <p:stCondLst>
+                                    <p:cond delay="0"/>
+                                  </p:stCondLst>
+                                  <p:childTnLst>
+                                    <p:set>
+                                      <p:cBhvr>
+                                        <p:cTn id="22" dur="1" fill="hold">
+                                          <p:stCondLst>
+                                            <p:cond delay="0"/>
+                                          </p:stCondLst>
+                                        </p:cTn>
+                                        <p:tgtEl>
+                                          <p:spTgt spid="12"/>
+                                        </p:tgtEl>
+                                        <p:attrNameLst>
+                                          <p:attrName>style.visibility</p:attrName>
+                                        </p:attrNameLst>
+                                      </p:cBhvr>
+                                      <p:to>
+                                        <p:strVal val="visible"/>
+                                      </p:to>
+                                    </p:set>
+                                  </p:childTnLst>
+                                </p:cTn>
+                              </p:par>
+                            </p:childTnLst>
+                          </p:cTn>
+                        </p:par>
+                      </p:childTnLst>
+                    </p:cTn>
+                  </p:par>
+                  <p:par>
+                    <p:cTn id="23" fill="hold">
+                      <p:stCondLst>
+                        <p:cond delay="indefinite"/>
+                      </p:stCondLst>
+                      <p:childTnLst>
+                        <p:par>
+                          <p:cTn id="24" fill="hold">
+                            <p:stCondLst>
+                              <p:cond delay="0"/>
+                            </p:stCondLst>
+                            <p:childTnLst>
+                              <p:par>
+                                <p:cTn id="25" presetID="1" presetClass="entr" presetSubtype="0" fill="hold" grpId="0" nodeType="clickEffect">
+                                  <p:stCondLst>
+                                    <p:cond delay="0"/>
+                                  </p:stCondLst>
+                                  <p:childTnLst>
+                                    <p:set>
+                                      <p:cBhvr>
+                                        <p:cTn id="26" dur="1" fill="hold">
+                                          <p:stCondLst>
+                                            <p:cond delay="0"/>
+                                          </p:stCondLst>
+                                        </p:cTn>
+                                        <p:tgtEl>
+                                          <p:spTgt spid="11"/>
+                                        </p:tgtEl>
+                                        <p:attrNameLst>
+                                          <p:attrName>style.visibility</p:attrName>
+                                        </p:attrNameLst>
+                                      </p:cBhvr>
+                                      <p:to>
+                                        <p:strVal val="visible"/>
+                                      </p:to>
+                                    </p:set>
+                                  </p:childTnLst>
+                                </p:cTn>
+                              </p:par>
+                            </p:childTnLst>
+                          </p:cTn>
+                        </p:par>
+                      </p:childTnLst>
+                    </p:cTn>
+                  </p:par>
+                </p:childTnLst>
+              </p:cTn>
+              <p:prevCondLst>
+                <p:cond evt="onPrev" delay="0">
+                  <p:tgtEl>
+                    <p:sldTgt/>
+                  </p:tgtEl>
+                </p:cond>
+              </p:prevCondLst>
+              <p:nextCondLst>
+                <p:cond evt="onNext" delay="0">
+                  <p:tgtEl>
+                    <p:sldTgt/>
+                  </p:tgtEl>
+                </p:cond>
+              </p:nextCondLst>
+            </p:seq>
+          </p:childTnLst>
+        </p:cTn>
+      </p:par>
+    </p:tnLst>
+    <p:bldLst>
+      <p:bldP spid="11" grpId="0" animBg="1"/>
+      <p:bldP spid="12" grpId="0" animBg="1"/>
+      <p:bldP spid="9" grpId="0" animBg="1"/>
+      <p:bldP spid="14" grpId="0" animBg="1"/>
+    </p:bldLst>
+  </p:timing>
+</p:sld>
+</file>
+
+<file path=ppt/slides/slide56.xml><?xml version="1.0" encoding="utf-8"?>
+<p:sld xmlns:a="http://schemas.openxmlformats.org/drawingml/2006/main" xmlns:r="http://schemas.openxmlformats.org/officeDocument/2006/relationships" xmlns:p="http://schemas.openxmlformats.org/presentationml/2006/main">
+  <p:cSld>
+    <p:spTree>
+      <p:nvGrpSpPr>
+        <p:cNvPr id="1" name=""/>
+        <p:cNvGrpSpPr/>
+        <p:nvPr/>
+      </p:nvGrpSpPr>
+      <p:grpSpPr>
+        <a:xfrm>
+          <a:off x="0" y="0"/>
+          <a:ext cx="0" cy="0"/>
+          <a:chOff x="0" y="0"/>
+          <a:chExt cx="0" cy="0"/>
+        </a:xfrm>
+      </p:grpSpPr>
+      <p:sp>
+        <p:nvSpPr>
+          <p:cNvPr id="2" name="Title 1"/>
+          <p:cNvSpPr>
+            <a:spLocks noGrp="1"/>
+          </p:cNvSpPr>
+          <p:nvPr>
+            <p:ph type="title"/>
+          </p:nvPr>
+        </p:nvSpPr>
+        <p:spPr/>
+        <p:txBody>
+          <a:bodyPr/>
+          <a:lstStyle/>
+          <a:p>
+            <a:r>
+              <a:rPr lang="en-US" dirty="0" smtClean="0"/>
               <a:t>ADC</a:t>
             </a:r>
             <a:endParaRPr lang="en-US" dirty="0"/>
@@ -38442,7 +39225,7 @@
 </p:sld>
 </file>
 
-<file path=ppt/slides/slide56.xml><?xml version="1.0" encoding="utf-8"?>
+<file path=ppt/slides/slide57.xml><?xml version="1.0" encoding="utf-8"?>
 <p:sld xmlns:a="http://schemas.openxmlformats.org/drawingml/2006/main" xmlns:r="http://schemas.openxmlformats.org/officeDocument/2006/relationships" xmlns:p="http://schemas.openxmlformats.org/presentationml/2006/main">
   <p:cSld>
     <p:spTree>
@@ -38545,7 +39328,7 @@
 </p:sld>
 </file>
 
-<file path=ppt/slides/slide57.xml><?xml version="1.0" encoding="utf-8"?>
+<file path=ppt/slides/slide58.xml><?xml version="1.0" encoding="utf-8"?>
 <p:sld xmlns:a="http://schemas.openxmlformats.org/drawingml/2006/main" xmlns:r="http://schemas.openxmlformats.org/officeDocument/2006/relationships" xmlns:p="http://schemas.openxmlformats.org/presentationml/2006/main" show="0">
   <p:cSld>
     <p:spTree>
@@ -38715,7 +39498,7 @@
 </p:sld>
 </file>
 
-<file path=ppt/slides/slide58.xml><?xml version="1.0" encoding="utf-8"?>
+<file path=ppt/slides/slide59.xml><?xml version="1.0" encoding="utf-8"?>
 <p:sld xmlns:a="http://schemas.openxmlformats.org/drawingml/2006/main" xmlns:r="http://schemas.openxmlformats.org/officeDocument/2006/relationships" xmlns:p="http://schemas.openxmlformats.org/presentationml/2006/main">
   <p:cSld>
     <p:spTree>

</xml_diff>